<commit_message>
Include Dr. J's suggestions in final presentation draft
</commit_message>
<xml_diff>
--- a/doc/AugRealityFinalPresentation.pptx
+++ b/doc/AugRealityFinalPresentation.pptx
@@ -19,12 +19,12 @@
     <p:sldId id="310" r:id="rId10"/>
     <p:sldId id="337" r:id="rId11"/>
     <p:sldId id="311" r:id="rId12"/>
-    <p:sldId id="338" r:id="rId13"/>
-    <p:sldId id="313" r:id="rId14"/>
-    <p:sldId id="314" r:id="rId15"/>
-    <p:sldId id="315" r:id="rId16"/>
-    <p:sldId id="312" r:id="rId17"/>
-    <p:sldId id="339" r:id="rId18"/>
+    <p:sldId id="344" r:id="rId13"/>
+    <p:sldId id="338" r:id="rId14"/>
+    <p:sldId id="313" r:id="rId15"/>
+    <p:sldId id="314" r:id="rId16"/>
+    <p:sldId id="315" r:id="rId17"/>
+    <p:sldId id="312" r:id="rId18"/>
     <p:sldId id="323" r:id="rId19"/>
     <p:sldId id="321" r:id="rId20"/>
     <p:sldId id="318" r:id="rId21"/>
@@ -146,7 +146,7 @@
   </p:defaultTextStyle>
   <p:extLst>
     <p:ext uri="{EFAFB233-063F-42B5-8137-9DF3F51BA10A}">
-      <p15:sldGuideLst xmlns="" xmlns:p15="http://schemas.microsoft.com/office/powerpoint/2012/main">
+      <p15:sldGuideLst xmlns:p15="http://schemas.microsoft.com/office/powerpoint/2012/main">
         <p15:guide id="1" orient="horz" pos="2160">
           <p15:clr>
             <a:srgbClr val="A4A3A4"/>
@@ -4743,8 +4743,13 @@
             <a:pPr lvl="1"/>
             <a:r>
               <a:rPr lang="en-US" dirty="0" smtClean="0"/>
-              <a:t>Update virtual world to match</a:t>
-            </a:r>
+              <a:t>Update virtual </a:t>
+            </a:r>
+            <a:r>
+              <a:rPr lang="en-US" dirty="0" smtClean="0"/>
+              <a:t>world</a:t>
+            </a:r>
+            <a:endParaRPr lang="en-US" dirty="0" smtClean="0"/>
           </a:p>
           <a:p>
             <a:r>
@@ -4799,6 +4804,13 @@
       </p:transition>
     </mc:Fallback>
   </mc:AlternateContent>
+  <p:timing>
+    <p:tnLst>
+      <p:par>
+        <p:cTn id="1" dur="indefinite" restart="never" nodeType="tmRoot"/>
+      </p:par>
+    </p:tnLst>
+  </p:timing>
 </p:sld>
 </file>
 
@@ -4935,6 +4947,97 @@
           <a:bodyPr/>
           <a:lstStyle/>
           <a:p>
+            <a:endParaRPr lang="en-US"/>
+          </a:p>
+        </p:txBody>
+      </p:sp>
+      <p:sp>
+        <p:nvSpPr>
+          <p:cNvPr id="3" name="Title 2"/>
+          <p:cNvSpPr>
+            <a:spLocks noGrp="1"/>
+          </p:cNvSpPr>
+          <p:nvPr>
+            <p:ph type="title"/>
+          </p:nvPr>
+        </p:nvSpPr>
+        <p:spPr/>
+        <p:txBody>
+          <a:bodyPr/>
+          <a:lstStyle/>
+          <a:p>
+            <a:r>
+              <a:rPr lang="en-US" dirty="0" smtClean="0"/>
+              <a:t>Software Diagram</a:t>
+            </a:r>
+            <a:endParaRPr lang="en-US" dirty="0"/>
+          </a:p>
+        </p:txBody>
+      </p:sp>
+    </p:spTree>
+    <p:extLst>
+      <p:ext uri="{BB962C8B-B14F-4D97-AF65-F5344CB8AC3E}">
+        <p14:creationId xmlns:p14="http://schemas.microsoft.com/office/powerpoint/2010/main" val="1134790367"/>
+      </p:ext>
+    </p:extLst>
+  </p:cSld>
+  <p:clrMapOvr>
+    <a:masterClrMapping/>
+  </p:clrMapOvr>
+  <mc:AlternateContent xmlns:mc="http://schemas.openxmlformats.org/markup-compatibility/2006">
+    <mc:Choice xmlns:p14="http://schemas.microsoft.com/office/powerpoint/2010/main" Requires="p14">
+      <p:transition p14:dur="200">
+        <p:fade/>
+      </p:transition>
+    </mc:Choice>
+    <mc:Fallback>
+      <p:transition>
+        <p:fade/>
+      </p:transition>
+    </mc:Fallback>
+  </mc:AlternateContent>
+  <p:timing>
+    <p:tnLst>
+      <p:par>
+        <p:cTn id="1" dur="indefinite" restart="never" nodeType="tmRoot"/>
+      </p:par>
+    </p:tnLst>
+  </p:timing>
+</p:sld>
+</file>
+
+<file path=ppt/slides/slide13.xml><?xml version="1.0" encoding="utf-8"?>
+<p:sld xmlns:a="http://schemas.openxmlformats.org/drawingml/2006/main" xmlns:r="http://schemas.openxmlformats.org/officeDocument/2006/relationships" xmlns:p="http://schemas.openxmlformats.org/presentationml/2006/main">
+  <p:cSld>
+    <p:spTree>
+      <p:nvGrpSpPr>
+        <p:cNvPr id="1" name=""/>
+        <p:cNvGrpSpPr/>
+        <p:nvPr/>
+      </p:nvGrpSpPr>
+      <p:grpSpPr>
+        <a:xfrm>
+          <a:off x="0" y="0"/>
+          <a:ext cx="0" cy="0"/>
+          <a:chOff x="0" y="0"/>
+          <a:chExt cx="0" cy="0"/>
+        </a:xfrm>
+      </p:grpSpPr>
+      <p:sp>
+        <p:nvSpPr>
+          <p:cNvPr id="2" name="Content Placeholder 1"/>
+          <p:cNvSpPr>
+            <a:spLocks noGrp="1"/>
+          </p:cNvSpPr>
+          <p:nvPr>
+            <p:ph idx="1"/>
+          </p:nvPr>
+        </p:nvSpPr>
+        <p:spPr/>
+        <p:txBody>
+          <a:bodyPr/>
+          <a:lstStyle/>
+          <a:p>
             <a:r>
               <a:rPr lang="en-US" dirty="0" smtClean="0"/>
               <a:t>Performance Metrics</a:t>
@@ -5015,10 +5118,17 @@
       </p:transition>
     </mc:Fallback>
   </mc:AlternateContent>
+  <p:timing>
+    <p:tnLst>
+      <p:par>
+        <p:cTn id="1" dur="indefinite" restart="never" nodeType="tmRoot"/>
+      </p:par>
+    </p:tnLst>
+  </p:timing>
 </p:sld>
 </file>
 
-<file path=ppt/slides/slide13.xml><?xml version="1.0" encoding="utf-8"?>
+<file path=ppt/slides/slide14.xml><?xml version="1.0" encoding="utf-8"?>
 <p:sld xmlns:a="http://schemas.openxmlformats.org/drawingml/2006/main" xmlns:r="http://schemas.openxmlformats.org/officeDocument/2006/relationships" xmlns:p="http://schemas.openxmlformats.org/presentationml/2006/main">
   <p:cSld>
     <p:spTree>
@@ -5063,11 +5173,7 @@
             <a:pPr lvl="1"/>
             <a:r>
               <a:rPr lang="en-US" dirty="0" smtClean="0"/>
-              <a:t>Mass [kg</a:t>
-            </a:r>
-            <a:r>
-              <a:rPr lang="en-US" dirty="0" smtClean="0"/>
-              <a:t>]</a:t>
+              <a:t>Mass [kg]</a:t>
             </a:r>
           </a:p>
           <a:p>
@@ -5087,19 +5193,13 @@
               <a:rPr lang="en-US" dirty="0" smtClean="0"/>
               <a:t>Virtual image quality</a:t>
             </a:r>
-            <a:endParaRPr lang="en-US" dirty="0" smtClean="0"/>
           </a:p>
           <a:p>
             <a:pPr lvl="1"/>
             <a:r>
               <a:rPr lang="en-US" dirty="0" smtClean="0"/>
-              <a:t>User </a:t>
-            </a:r>
-            <a:r>
-              <a:rPr lang="en-US" dirty="0" smtClean="0"/>
-              <a:t>experience survey</a:t>
-            </a:r>
-            <a:endParaRPr lang="en-US" dirty="0" smtClean="0"/>
+              <a:t>User experience survey</a:t>
+            </a:r>
           </a:p>
         </p:txBody>
       </p:sp>
@@ -5120,11 +5220,7 @@
           <a:p>
             <a:r>
               <a:rPr lang="en-US" dirty="0" smtClean="0"/>
-              <a:t>Performance </a:t>
-            </a:r>
-            <a:r>
-              <a:rPr lang="en-US" dirty="0" smtClean="0"/>
-              <a:t>Metrics</a:t>
+              <a:t>Performance Metrics</a:t>
             </a:r>
             <a:endParaRPr lang="en-US" dirty="0"/>
           </a:p>
@@ -5201,7 +5297,7 @@
 </p:sld>
 </file>
 
-<file path=ppt/slides/slide14.xml><?xml version="1.0" encoding="utf-8"?>
+<file path=ppt/slides/slide15.xml><?xml version="1.0" encoding="utf-8"?>
 <p:sld xmlns:a="http://schemas.openxmlformats.org/drawingml/2006/main" xmlns:r="http://schemas.openxmlformats.org/officeDocument/2006/relationships" xmlns:p="http://schemas.openxmlformats.org/presentationml/2006/main">
   <p:cSld>
     <p:spTree>
@@ -5286,7 +5382,6 @@
               <a:rPr lang="en-US" dirty="0"/>
               <a:t>Performance Metrics</a:t>
             </a:r>
-            <a:endParaRPr lang="en-US" dirty="0"/>
           </a:p>
         </p:txBody>
       </p:sp>
@@ -5479,7 +5574,7 @@
 </p:sld>
 </file>
 
-<file path=ppt/slides/slide15.xml><?xml version="1.0" encoding="utf-8"?>
+<file path=ppt/slides/slide16.xml><?xml version="1.0" encoding="utf-8"?>
 <p:sld xmlns:a="http://schemas.openxmlformats.org/drawingml/2006/main" xmlns:r="http://schemas.openxmlformats.org/officeDocument/2006/relationships" xmlns:p="http://schemas.openxmlformats.org/presentationml/2006/main">
   <p:cSld>
     <p:spTree>
@@ -5559,7 +5654,6 @@
               <a:rPr lang="en-US" dirty="0"/>
               <a:t>Performance Metrics</a:t>
             </a:r>
-            <a:endParaRPr lang="en-US" dirty="0"/>
           </a:p>
         </p:txBody>
       </p:sp>
@@ -5684,7 +5778,7 @@
 </p:sld>
 </file>
 
-<file path=ppt/slides/slide16.xml><?xml version="1.0" encoding="utf-8"?>
+<file path=ppt/slides/slide17.xml><?xml version="1.0" encoding="utf-8"?>
 <p:sld xmlns:a="http://schemas.openxmlformats.org/drawingml/2006/main" xmlns:r="http://schemas.openxmlformats.org/officeDocument/2006/relationships" xmlns:p="http://schemas.openxmlformats.org/presentationml/2006/main">
   <p:cSld>
     <p:spTree>
@@ -5718,11 +5812,7 @@
           <a:p>
             <a:r>
               <a:rPr lang="en-US" dirty="0" smtClean="0"/>
-              <a:t>Performance </a:t>
-            </a:r>
-            <a:r>
-              <a:rPr lang="en-US" dirty="0" smtClean="0"/>
-              <a:t>Results</a:t>
+              <a:t>Performance Results</a:t>
             </a:r>
             <a:endParaRPr lang="en-US" dirty="0"/>
           </a:p>
@@ -7177,122 +7267,6 @@
 </p:sld>
 </file>
 
-<file path=ppt/slides/slide17.xml><?xml version="1.0" encoding="utf-8"?>
-<p:sld xmlns:a="http://schemas.openxmlformats.org/drawingml/2006/main" xmlns:r="http://schemas.openxmlformats.org/officeDocument/2006/relationships" xmlns:p="http://schemas.openxmlformats.org/presentationml/2006/main">
-  <p:cSld>
-    <p:spTree>
-      <p:nvGrpSpPr>
-        <p:cNvPr id="1" name=""/>
-        <p:cNvGrpSpPr/>
-        <p:nvPr/>
-      </p:nvGrpSpPr>
-      <p:grpSpPr>
-        <a:xfrm>
-          <a:off x="0" y="0"/>
-          <a:ext cx="0" cy="0"/>
-          <a:chOff x="0" y="0"/>
-          <a:chExt cx="0" cy="0"/>
-        </a:xfrm>
-      </p:grpSpPr>
-      <p:sp>
-        <p:nvSpPr>
-          <p:cNvPr id="2" name="Content Placeholder 1"/>
-          <p:cNvSpPr>
-            <a:spLocks noGrp="1"/>
-          </p:cNvSpPr>
-          <p:nvPr>
-            <p:ph idx="1"/>
-          </p:nvPr>
-        </p:nvSpPr>
-        <p:spPr/>
-        <p:txBody>
-          <a:bodyPr/>
-          <a:lstStyle/>
-          <a:p>
-            <a:r>
-              <a:rPr lang="en-US" dirty="0"/>
-              <a:t>Technical </a:t>
-            </a:r>
-            <a:r>
-              <a:rPr lang="en-US" dirty="0" smtClean="0"/>
-              <a:t>Innovation</a:t>
-            </a:r>
-          </a:p>
-          <a:p>
-            <a:r>
-              <a:rPr lang="en-US" dirty="0" smtClean="0"/>
-              <a:t>Technical </a:t>
-            </a:r>
-            <a:r>
-              <a:rPr lang="en-US" dirty="0"/>
-              <a:t>Features</a:t>
-            </a:r>
-          </a:p>
-          <a:p>
-            <a:pPr lvl="1"/>
-            <a:r>
-              <a:rPr lang="en-US" dirty="0" smtClean="0"/>
-              <a:t>Phase 1</a:t>
-            </a:r>
-          </a:p>
-          <a:p>
-            <a:pPr lvl="1"/>
-            <a:r>
-              <a:rPr lang="en-US" dirty="0" smtClean="0"/>
-              <a:t>Phase 2</a:t>
-            </a:r>
-            <a:endParaRPr lang="en-US" dirty="0"/>
-          </a:p>
-        </p:txBody>
-      </p:sp>
-      <p:sp>
-        <p:nvSpPr>
-          <p:cNvPr id="3" name="Title 2"/>
-          <p:cNvSpPr>
-            <a:spLocks noGrp="1"/>
-          </p:cNvSpPr>
-          <p:nvPr>
-            <p:ph type="title"/>
-          </p:nvPr>
-        </p:nvSpPr>
-        <p:spPr/>
-        <p:txBody>
-          <a:bodyPr/>
-          <a:lstStyle/>
-          <a:p>
-            <a:r>
-              <a:rPr lang="en-US" dirty="0" smtClean="0"/>
-              <a:t>Technical Ingenuity</a:t>
-            </a:r>
-            <a:endParaRPr lang="en-US" dirty="0"/>
-          </a:p>
-        </p:txBody>
-      </p:sp>
-    </p:spTree>
-    <p:extLst>
-      <p:ext uri="{BB962C8B-B14F-4D97-AF65-F5344CB8AC3E}">
-        <p14:creationId xmlns:p14="http://schemas.microsoft.com/office/powerpoint/2010/main" val="3508948371"/>
-      </p:ext>
-    </p:extLst>
-  </p:cSld>
-  <p:clrMapOvr>
-    <a:masterClrMapping/>
-  </p:clrMapOvr>
-  <mc:AlternateContent xmlns:mc="http://schemas.openxmlformats.org/markup-compatibility/2006" xmlns:p14="http://schemas.microsoft.com/office/powerpoint/2010/main">
-    <mc:Choice Requires="p14">
-      <p:transition p14:dur="200">
-        <p:fade/>
-      </p:transition>
-    </mc:Choice>
-    <mc:Fallback xmlns="">
-      <p:transition>
-        <p:fade/>
-      </p:transition>
-    </mc:Fallback>
-  </mc:AlternateContent>
-</p:sld>
-</file>
-
 <file path=ppt/slides/slide18.xml><?xml version="1.0" encoding="utf-8"?>
 <p:sld xmlns:a="http://schemas.openxmlformats.org/drawingml/2006/main" xmlns:r="http://schemas.openxmlformats.org/officeDocument/2006/relationships" xmlns:p="http://schemas.openxmlformats.org/presentationml/2006/main">
   <p:cSld>
@@ -7329,13 +7303,8 @@
           <a:p>
             <a:r>
               <a:rPr lang="en-US" dirty="0" smtClean="0"/>
-              <a:t>Overlay virtual </a:t>
-            </a:r>
-            <a:r>
-              <a:rPr lang="en-US" dirty="0" smtClean="0"/>
-              <a:t>world</a:t>
-            </a:r>
-            <a:endParaRPr lang="en-US" dirty="0" smtClean="0"/>
+              <a:t>Overlay virtual world</a:t>
+            </a:r>
           </a:p>
           <a:p>
             <a:pPr lvl="1"/>
@@ -7348,11 +7317,7 @@
             <a:pPr lvl="1"/>
             <a:r>
               <a:rPr lang="en-US" dirty="0" smtClean="0"/>
-              <a:t>Large </a:t>
-            </a:r>
-            <a:r>
-              <a:rPr lang="en-US" dirty="0" smtClean="0"/>
-              <a:t>field of </a:t>
+              <a:t>Large field of </a:t>
             </a:r>
             <a:r>
               <a:rPr lang="en-US" dirty="0"/>
@@ -7362,13 +7327,16 @@
               <a:rPr lang="en-US" dirty="0" smtClean="0"/>
               <a:t>°)</a:t>
             </a:r>
-            <a:endParaRPr lang="en-US" dirty="0" smtClean="0"/>
           </a:p>
           <a:p>
             <a:pPr lvl="1"/>
             <a:r>
               <a:rPr lang="en-US" dirty="0" smtClean="0"/>
-              <a:t>Both eyes, reduced eye strain</a:t>
+              <a:t>Reduced </a:t>
+            </a:r>
+            <a:r>
+              <a:rPr lang="en-US" dirty="0" smtClean="0"/>
+              <a:t>eye strain</a:t>
             </a:r>
           </a:p>
           <a:p>
@@ -7391,7 +7359,6 @@
               <a:rPr lang="en-US" dirty="0" smtClean="0"/>
               <a:t>of orientation</a:t>
             </a:r>
-            <a:endParaRPr lang="en-US" dirty="0" smtClean="0"/>
           </a:p>
           <a:p>
             <a:r>
@@ -7512,8 +7479,9 @@
             <a:pPr lvl="1"/>
             <a:r>
               <a:rPr lang="en-US" sz="2800" dirty="0" smtClean="0"/>
-              <a:t>Adjustable for user</a:t>
-            </a:r>
+              <a:t>Adjustable</a:t>
+            </a:r>
+            <a:endParaRPr lang="en-US" sz="2800" dirty="0" smtClean="0"/>
           </a:p>
           <a:p>
             <a:pPr lvl="1"/>
@@ -7521,7 +7489,6 @@
               <a:rPr lang="en-US" sz="2800" dirty="0" smtClean="0"/>
               <a:t>Lightweight, balanced</a:t>
             </a:r>
-            <a:endParaRPr lang="en-US" sz="2800" dirty="0" smtClean="0"/>
           </a:p>
           <a:p>
             <a:r>
@@ -7587,7 +7554,6 @@
               <a:rPr lang="en-US" dirty="0"/>
               <a:t>Technical Innovation</a:t>
             </a:r>
-            <a:endParaRPr lang="en-US" dirty="0"/>
           </a:p>
         </p:txBody>
       </p:sp>
@@ -7890,8 +7856,12 @@
           </a:p>
           <a:p>
             <a:r>
+              <a:rPr lang="en-US" sz="3200" dirty="0" smtClean="0"/>
+              <a:t>900 </a:t>
+            </a:r>
+            <a:r>
               <a:rPr lang="en-US" sz="3200" dirty="0"/>
-              <a:t>Long-range 900 MHz </a:t>
+              <a:t>MHz </a:t>
             </a:r>
             <a:r>
               <a:rPr lang="en-US" sz="3200" dirty="0" smtClean="0"/>
@@ -7937,11 +7907,7 @@
           <a:p>
             <a:r>
               <a:rPr lang="en-US" dirty="0" smtClean="0"/>
-              <a:t>Technical Features </a:t>
-            </a:r>
-            <a:r>
-              <a:rPr lang="en-US" dirty="0" smtClean="0"/>
-              <a:t>(</a:t>
+              <a:t>Technical Features (</a:t>
             </a:r>
             <a:r>
               <a:rPr lang="en-US" i="1" dirty="0" smtClean="0"/>
@@ -8016,6 +7982,13 @@
       </p:transition>
     </mc:Fallback>
   </mc:AlternateContent>
+  <p:timing>
+    <p:tnLst>
+      <p:par>
+        <p:cTn id="1" dur="indefinite" restart="never" nodeType="tmRoot"/>
+      </p:par>
+    </p:tnLst>
+  </p:timing>
 </p:sld>
 </file>
 
@@ -8055,7 +8028,11 @@
           <a:p>
             <a:r>
               <a:rPr lang="en-US" sz="3200" dirty="0" smtClean="0"/>
-              <a:t>High bandwidth Wireless N network</a:t>
+              <a:t>Wireless </a:t>
+            </a:r>
+            <a:r>
+              <a:rPr lang="en-US" sz="3200" dirty="0" smtClean="0"/>
+              <a:t>N network</a:t>
             </a:r>
           </a:p>
           <a:p>
@@ -8069,20 +8046,32 @@
             <a:pPr lvl="1"/>
             <a:r>
               <a:rPr lang="en-US" sz="2800" dirty="0" smtClean="0"/>
-              <a:t>Elimination of dedicated server</a:t>
+              <a:t>Eliminate dedicated </a:t>
+            </a:r>
+            <a:r>
+              <a:rPr lang="en-US" sz="2800" dirty="0" smtClean="0"/>
+              <a:t>server</a:t>
             </a:r>
           </a:p>
           <a:p>
             <a:r>
               <a:rPr lang="en-US" sz="3200" dirty="0" smtClean="0"/>
-              <a:t>Increased virtual image fidelity</a:t>
+              <a:t>Virtual </a:t>
+            </a:r>
+            <a:r>
+              <a:rPr lang="en-US" sz="3200" dirty="0" smtClean="0"/>
+              <a:t>image fidelity</a:t>
             </a:r>
           </a:p>
           <a:p>
             <a:pPr lvl="1"/>
             <a:r>
               <a:rPr lang="en-US" sz="2800" dirty="0" smtClean="0"/>
-              <a:t>Improved brightness and contrast</a:t>
+              <a:t>Improve </a:t>
+            </a:r>
+            <a:r>
+              <a:rPr lang="en-US" sz="2800" dirty="0" smtClean="0"/>
+              <a:t>brightness and contrast</a:t>
             </a:r>
           </a:p>
           <a:p>
@@ -8119,19 +8108,11 @@
           <a:p>
             <a:r>
               <a:rPr lang="en-US" dirty="0" smtClean="0"/>
-              <a:t>Technical </a:t>
-            </a:r>
-            <a:r>
-              <a:rPr lang="en-US" dirty="0" smtClean="0"/>
-              <a:t>Features (</a:t>
+              <a:t>Technical Features (</a:t>
             </a:r>
             <a:r>
               <a:rPr lang="en-US" i="1" dirty="0" smtClean="0"/>
-              <a:t>Phase </a:t>
-            </a:r>
-            <a:r>
-              <a:rPr lang="en-US" i="1" dirty="0" smtClean="0"/>
-              <a:t>2</a:t>
+              <a:t>Phase 2</a:t>
             </a:r>
             <a:r>
               <a:rPr lang="en-US" dirty="0" smtClean="0"/>
@@ -8820,19 +8801,12 @@
           <a:lstStyle/>
           <a:p>
             <a:r>
-              <a:rPr lang="en-US" dirty="0"/>
-              <a:t>Delays due to </a:t>
-            </a:r>
-            <a:r>
-              <a:rPr lang="en-US" dirty="0" smtClean="0"/>
-              <a:t>coursework, events</a:t>
-            </a:r>
-            <a:endParaRPr lang="en-US" dirty="0"/>
-          </a:p>
-          <a:p>
-            <a:r>
-              <a:rPr lang="en-US" dirty="0" smtClean="0"/>
-              <a:t>DE2i-150 graphics drivers</a:t>
+              <a:rPr lang="en-US" dirty="0" smtClean="0"/>
+              <a:t>DE2i-150 </a:t>
+            </a:r>
+            <a:r>
+              <a:rPr lang="en-US" dirty="0" smtClean="0"/>
+              <a:t>graphics drivers</a:t>
             </a:r>
           </a:p>
           <a:p>
@@ -8851,7 +8825,11 @@
           <a:p>
             <a:r>
               <a:rPr lang="en-US" dirty="0" smtClean="0"/>
-              <a:t>User testing</a:t>
+              <a:t>User </a:t>
+            </a:r>
+            <a:r>
+              <a:rPr lang="en-US" dirty="0" smtClean="0"/>
+              <a:t>testing is subjective</a:t>
             </a:r>
             <a:endParaRPr lang="en-US" dirty="0"/>
           </a:p>
@@ -8967,11 +8945,7 @@
             </a:r>
             <a:r>
               <a:rPr lang="en-US" dirty="0" smtClean="0"/>
-              <a:t>may be </a:t>
-            </a:r>
-            <a:r>
-              <a:rPr lang="en-US" dirty="0" smtClean="0"/>
-              <a:t>required</a:t>
+              <a:t>may be required</a:t>
             </a:r>
           </a:p>
           <a:p>
@@ -9011,17 +8985,8 @@
             <a:pPr lvl="1"/>
             <a:r>
               <a:rPr lang="en-US" dirty="0" smtClean="0"/>
-              <a:t>Translucent display allows awareness </a:t>
-            </a:r>
-            <a:r>
-              <a:rPr lang="en-US" dirty="0" smtClean="0"/>
-              <a:t>of </a:t>
-            </a:r>
-            <a:r>
-              <a:rPr lang="en-US" dirty="0" smtClean="0"/>
-              <a:t>environment</a:t>
-            </a:r>
-            <a:endParaRPr lang="en-US" dirty="0" smtClean="0"/>
+              <a:t>Translucent display allows awareness of environment</a:t>
+            </a:r>
           </a:p>
         </p:txBody>
       </p:sp>
@@ -9290,13 +9255,8 @@
             <a:pPr lvl="1"/>
             <a:r>
               <a:rPr lang="en-US" sz="2800" dirty="0" smtClean="0"/>
-              <a:t>User </a:t>
-            </a:r>
-            <a:r>
-              <a:rPr lang="en-US" sz="2800" dirty="0" smtClean="0"/>
-              <a:t>interface</a:t>
-            </a:r>
-            <a:endParaRPr lang="en-US" sz="2800" dirty="0" smtClean="0"/>
+              <a:t>User interface</a:t>
+            </a:r>
           </a:p>
           <a:p>
             <a:r>
@@ -9308,25 +9268,26 @@
             <a:pPr lvl="1"/>
             <a:r>
               <a:rPr lang="en-US" sz="2800" dirty="0" smtClean="0"/>
-              <a:t>Longer total runtime, lighter weight</a:t>
-            </a:r>
+              <a:t>Longer battery life</a:t>
+            </a:r>
+            <a:endParaRPr lang="en-US" sz="2800" dirty="0" smtClean="0"/>
           </a:p>
           <a:p>
             <a:pPr lvl="1"/>
             <a:r>
               <a:rPr lang="en-US" sz="2800" dirty="0" smtClean="0"/>
-              <a:t>Better graphics </a:t>
-            </a:r>
+              <a:t>Better graphics performance</a:t>
+            </a:r>
+          </a:p>
+          <a:p>
+            <a:pPr lvl="1"/>
             <a:r>
               <a:rPr lang="en-US" sz="2800" dirty="0" smtClean="0"/>
-              <a:t>performance</a:t>
-            </a:r>
-          </a:p>
-          <a:p>
-            <a:pPr lvl="1"/>
+              <a:t>High </a:t>
+            </a:r>
             <a:r>
               <a:rPr lang="en-US" sz="2800" dirty="0" smtClean="0"/>
-              <a:t>Significant cost (over $100)</a:t>
+              <a:t>cost (over $100)</a:t>
             </a:r>
             <a:endParaRPr lang="en-US" sz="2800" dirty="0"/>
           </a:p>
@@ -9518,42 +9479,23 @@
             <a:pPr lvl="1"/>
             <a:r>
               <a:rPr lang="en-US" dirty="0" smtClean="0"/>
-              <a:t>Software sales, 3</a:t>
-            </a:r>
-            <a:r>
-              <a:rPr lang="en-US" baseline="30000" dirty="0" smtClean="0"/>
-              <a:t>rd</a:t>
-            </a:r>
-            <a:r>
-              <a:rPr lang="en-US" dirty="0" smtClean="0"/>
-              <a:t> party development</a:t>
+              <a:t>Software sales, SDK</a:t>
             </a:r>
             <a:endParaRPr lang="en-US" dirty="0"/>
           </a:p>
           <a:p>
             <a:pPr lvl="1"/>
             <a:r>
-              <a:rPr lang="en-US" dirty="0"/>
-              <a:t>Sell to schools for education</a:t>
-            </a:r>
+              <a:rPr lang="en-US" dirty="0" smtClean="0"/>
+              <a:t>Sell to schools</a:t>
+            </a:r>
+            <a:endParaRPr lang="en-US" dirty="0"/>
           </a:p>
           <a:p>
             <a:pPr lvl="1"/>
             <a:r>
-              <a:rPr lang="en-US" dirty="0"/>
-              <a:t>Sell to </a:t>
-            </a:r>
-            <a:r>
-              <a:rPr lang="en-US" dirty="0" smtClean="0"/>
-              <a:t>firms </a:t>
-            </a:r>
-            <a:r>
-              <a:rPr lang="en-US" dirty="0"/>
-              <a:t>for employee </a:t>
-            </a:r>
-            <a:r>
-              <a:rPr lang="en-US" dirty="0" smtClean="0"/>
-              <a:t>training</a:t>
+              <a:rPr lang="en-US" dirty="0" smtClean="0"/>
+              <a:t>Sell to firms for training</a:t>
             </a:r>
             <a:endParaRPr lang="en-US" dirty="0"/>
           </a:p>
@@ -9727,6 +9669,13 @@
       </p:transition>
     </mc:Fallback>
   </mc:AlternateContent>
+  <p:timing>
+    <p:tnLst>
+      <p:par>
+        <p:cTn id="1" dur="indefinite" restart="never" nodeType="tmRoot"/>
+      </p:par>
+    </p:tnLst>
+  </p:timing>
 </p:sld>
 </file>
 
@@ -9757,7 +9706,12 @@
             <p:ph idx="1"/>
           </p:nvPr>
         </p:nvSpPr>
-        <p:spPr/>
+        <p:spPr>
+          <a:xfrm>
+            <a:off x="380999" y="1524000"/>
+            <a:ext cx="8407893" cy="4602479"/>
+          </a:xfrm>
+        </p:spPr>
         <p:txBody>
           <a:bodyPr>
             <a:normAutofit/>
@@ -9803,8 +9757,43 @@
           <a:p>
             <a:r>
               <a:rPr lang="en-US" sz="3200" dirty="0" smtClean="0"/>
-              <a:t>Joseph Boettcher, ECE lab staff</a:t>
-            </a:r>
+              <a:t>Joseph </a:t>
+            </a:r>
+            <a:r>
+              <a:rPr lang="en-US" sz="3200" dirty="0" err="1" smtClean="0"/>
+              <a:t>Bougher</a:t>
+            </a:r>
+            <a:r>
+              <a:rPr lang="en-US" sz="3200" dirty="0" smtClean="0"/>
+              <a:t>, </a:t>
+            </a:r>
+            <a:r>
+              <a:rPr lang="en-US" sz="3200" dirty="0" smtClean="0"/>
+              <a:t>ECE lab </a:t>
+            </a:r>
+            <a:r>
+              <a:rPr lang="en-US" sz="3200" dirty="0" smtClean="0"/>
+              <a:t>staff</a:t>
+            </a:r>
+          </a:p>
+          <a:p>
+            <a:r>
+              <a:rPr lang="en-US" sz="3200" dirty="0" smtClean="0"/>
+              <a:t>Dr. </a:t>
+            </a:r>
+            <a:r>
+              <a:rPr lang="en-US" sz="3200" dirty="0" err="1" smtClean="0"/>
+              <a:t>Karthik</a:t>
+            </a:r>
+            <a:r>
+              <a:rPr lang="en-US" sz="3200" dirty="0" smtClean="0"/>
+              <a:t> </a:t>
+            </a:r>
+            <a:r>
+              <a:rPr lang="en-US" sz="3200" dirty="0" err="1" smtClean="0"/>
+              <a:t>Ramani</a:t>
+            </a:r>
+            <a:endParaRPr lang="en-US" sz="3200" dirty="0" smtClean="0"/>
           </a:p>
           <a:p>
             <a:r>
@@ -10961,6 +10950,13 @@
       </p:transition>
     </mc:Fallback>
   </mc:AlternateContent>
+  <p:timing>
+    <p:tnLst>
+      <p:par>
+        <p:cTn id="1" dur="indefinite" restart="never" nodeType="tmRoot"/>
+      </p:par>
+    </p:tnLst>
+  </p:timing>
 </p:sld>
 </file>
 
@@ -11203,11 +11199,7 @@
           <a:p>
             <a:r>
               <a:rPr lang="en-US" dirty="0" smtClean="0"/>
-              <a:t>Portable</a:t>
-            </a:r>
-            <a:r>
-              <a:rPr lang="en-US" dirty="0" smtClean="0"/>
-              <a:t>, comfortable, easy to use</a:t>
+              <a:t>Portable, comfortable, easy to use</a:t>
             </a:r>
             <a:endParaRPr lang="en-US" dirty="0"/>
           </a:p>
@@ -11329,11 +11321,7 @@
           <a:p>
             <a:r>
               <a:rPr lang="en-US" dirty="0" smtClean="0"/>
-              <a:t>Educational </a:t>
-            </a:r>
-            <a:r>
-              <a:rPr lang="en-US" dirty="0" smtClean="0"/>
-              <a:t>and training</a:t>
+              <a:t>Educational and training</a:t>
             </a:r>
             <a:endParaRPr lang="en-US" dirty="0"/>
           </a:p>
@@ -11706,8 +11694,19 @@
           <a:p>
             <a:r>
               <a:rPr lang="en-US" dirty="0" smtClean="0"/>
-              <a:t>Block Diagram</a:t>
-            </a:r>
+              <a:t>Block </a:t>
+            </a:r>
+            <a:r>
+              <a:rPr lang="en-US" dirty="0" smtClean="0"/>
+              <a:t>Diagram</a:t>
+            </a:r>
+          </a:p>
+          <a:p>
+            <a:r>
+              <a:rPr lang="en-US" dirty="0" smtClean="0"/>
+              <a:t>Software Diagram</a:t>
+            </a:r>
+            <a:endParaRPr lang="en-US" dirty="0" smtClean="0"/>
           </a:p>
         </p:txBody>
       </p:sp>
@@ -11756,6 +11755,13 @@
       </p:transition>
     </mc:Fallback>
   </mc:AlternateContent>
+  <p:timing>
+    <p:tnLst>
+      <p:par>
+        <p:cTn id="1" dur="indefinite" restart="never" nodeType="tmRoot"/>
+      </p:par>
+    </p:tnLst>
+  </p:timing>
 </p:sld>
 </file>
 
@@ -11793,11 +11799,7 @@
           <a:p>
             <a:r>
               <a:rPr lang="en-US" dirty="0" smtClean="0"/>
-              <a:t>Multi-user </a:t>
-            </a:r>
-            <a:r>
-              <a:rPr lang="en-US" dirty="0" smtClean="0"/>
-              <a:t>gaming</a:t>
+              <a:t>Multi-user gaming</a:t>
             </a:r>
           </a:p>
           <a:p>
@@ -11811,11 +11813,7 @@
             <a:pPr lvl="1"/>
             <a:r>
               <a:rPr lang="en-US" dirty="0" smtClean="0"/>
-              <a:t>Integrate </a:t>
-            </a:r>
-            <a:r>
-              <a:rPr lang="en-US" dirty="0" smtClean="0"/>
-              <a:t>with real world</a:t>
+              <a:t>Integrate with real world</a:t>
             </a:r>
             <a:endParaRPr lang="en-US" dirty="0"/>
           </a:p>
@@ -11919,11 +11917,6 @@
               </a:rPr>
               <a:t>Orientation tracking</a:t>
             </a:r>
-            <a:endParaRPr lang="en-US" sz="2400" dirty="0" smtClean="0">
-              <a:solidFill>
-                <a:srgbClr val="534949"/>
-              </a:solidFill>
-            </a:endParaRPr>
           </a:p>
           <a:p>
             <a:pPr marL="548640" lvl="1" indent="-182880">
@@ -11944,11 +11937,6 @@
               </a:rPr>
               <a:t>Location tracking</a:t>
             </a:r>
-            <a:endParaRPr lang="en-US" sz="2400" dirty="0" smtClean="0">
-              <a:solidFill>
-                <a:srgbClr val="534949"/>
-              </a:solidFill>
-            </a:endParaRPr>
           </a:p>
         </p:txBody>
       </p:sp>
@@ -12007,11 +11995,6 @@
               </a:rPr>
               <a:t>Wireless</a:t>
             </a:r>
-            <a:endParaRPr lang="en-US" sz="2400" dirty="0" smtClean="0">
-              <a:solidFill>
-                <a:srgbClr val="534949"/>
-              </a:solidFill>
-            </a:endParaRPr>
           </a:p>
           <a:p>
             <a:pPr marL="548640" lvl="1" indent="-182880">
@@ -12596,7 +12579,7 @@
   <a:extraClrSchemeLst/>
   <a:extLst>
     <a:ext uri="{05A4C25C-085E-4340-85A3-A5531E510DB2}">
-      <thm15:themeFamily xmlns="" xmlns:thm15="http://schemas.microsoft.com/office/thememl/2012/main" name="Office Theme" id="{62F939B6-93AF-4DB8-9C6B-D6C7DFDC589F}" vid="{4A3C46E8-61CC-4603-A589-7422A47A8E4A}"/>
+      <thm15:themeFamily xmlns:thm15="http://schemas.microsoft.com/office/thememl/2012/main" name="Office Theme" id="{62F939B6-93AF-4DB8-9C6B-D6C7DFDC589F}" vid="{4A3C46E8-61CC-4603-A589-7422A47A8E4A}"/>
     </a:ext>
   </a:extLst>
 </a:theme>

</xml_diff>

<commit_message>
Update presentation to add software diagram
</commit_message>
<xml_diff>
--- a/doc/AugRealityFinalPresentation.pptx
+++ b/doc/AugRealityFinalPresentation.pptx
@@ -146,7 +146,7 @@
   </p:defaultTextStyle>
   <p:extLst>
     <p:ext uri="{EFAFB233-063F-42B5-8137-9DF3F51BA10A}">
-      <p15:sldGuideLst xmlns:p15="http://schemas.microsoft.com/office/powerpoint/2012/main">
+      <p15:sldGuideLst xmlns:p15="http://schemas.microsoft.com/office/powerpoint/2012/main" xmlns="">
         <p15:guide id="1" orient="horz" pos="2160">
           <p15:clr>
             <a:srgbClr val="A4A3A4"/>
@@ -245,7 +245,7 @@
           <a:p>
             <a:fld id="{7A466098-8D44-47E3-A6D0-3EBDA642D1D9}" type="datetimeFigureOut">
               <a:rPr lang="en-US" smtClean="0"/>
-              <a:t>4/28/2014</a:t>
+              <a:t>4/29/2014</a:t>
             </a:fld>
             <a:endParaRPr lang="en-US" dirty="0"/>
           </a:p>
@@ -766,7 +766,7 @@
           <a:p>
             <a:fld id="{CC2990F0-8476-4A68-82FA-873BDD6B740E}" type="datetimeFigureOut">
               <a:rPr lang="en-US" smtClean="0"/>
-              <a:t>4/28/2014</a:t>
+              <a:t>4/29/2014</a:t>
             </a:fld>
             <a:endParaRPr lang="en-US" dirty="0"/>
           </a:p>
@@ -991,7 +991,7 @@
           <a:p>
             <a:fld id="{CC2990F0-8476-4A68-82FA-873BDD6B740E}" type="datetimeFigureOut">
               <a:rPr lang="en-US" smtClean="0"/>
-              <a:t>4/28/2014</a:t>
+              <a:t>4/29/2014</a:t>
             </a:fld>
             <a:endParaRPr lang="en-US" dirty="0"/>
           </a:p>
@@ -1270,7 +1270,7 @@
           <a:p>
             <a:fld id="{CC2990F0-8476-4A68-82FA-873BDD6B740E}" type="datetimeFigureOut">
               <a:rPr lang="en-US" smtClean="0"/>
-              <a:t>4/28/2014</a:t>
+              <a:t>4/29/2014</a:t>
             </a:fld>
             <a:endParaRPr lang="en-US" dirty="0"/>
           </a:p>
@@ -1450,7 +1450,7 @@
           <a:p>
             <a:fld id="{CC2990F0-8476-4A68-82FA-873BDD6B740E}" type="datetimeFigureOut">
               <a:rPr lang="en-US" smtClean="0"/>
-              <a:t>4/28/2014</a:t>
+              <a:t>4/29/2014</a:t>
             </a:fld>
             <a:endParaRPr lang="en-US" dirty="0"/>
           </a:p>
@@ -1803,7 +1803,7 @@
           <a:p>
             <a:fld id="{CC2990F0-8476-4A68-82FA-873BDD6B740E}" type="datetimeFigureOut">
               <a:rPr lang="en-US" smtClean="0"/>
-              <a:t>4/28/2014</a:t>
+              <a:t>4/29/2014</a:t>
             </a:fld>
             <a:endParaRPr lang="en-US" dirty="0"/>
           </a:p>
@@ -2123,7 +2123,7 @@
           <a:p>
             <a:fld id="{CC2990F0-8476-4A68-82FA-873BDD6B740E}" type="datetimeFigureOut">
               <a:rPr lang="en-US" smtClean="0"/>
-              <a:t>4/28/2014</a:t>
+              <a:t>4/29/2014</a:t>
             </a:fld>
             <a:endParaRPr lang="en-US" dirty="0"/>
           </a:p>
@@ -2556,7 +2556,7 @@
           <a:p>
             <a:fld id="{CC2990F0-8476-4A68-82FA-873BDD6B740E}" type="datetimeFigureOut">
               <a:rPr lang="en-US" smtClean="0"/>
-              <a:t>4/28/2014</a:t>
+              <a:t>4/29/2014</a:t>
             </a:fld>
             <a:endParaRPr lang="en-US" dirty="0"/>
           </a:p>
@@ -2681,7 +2681,7 @@
           <a:p>
             <a:fld id="{CC2990F0-8476-4A68-82FA-873BDD6B740E}" type="datetimeFigureOut">
               <a:rPr lang="en-US" smtClean="0"/>
-              <a:t>4/28/2014</a:t>
+              <a:t>4/29/2014</a:t>
             </a:fld>
             <a:endParaRPr lang="en-US" dirty="0"/>
           </a:p>
@@ -2852,7 +2852,7 @@
           <a:p>
             <a:fld id="{CC2990F0-8476-4A68-82FA-873BDD6B740E}" type="datetimeFigureOut">
               <a:rPr lang="en-US" smtClean="0"/>
-              <a:t>4/28/2014</a:t>
+              <a:t>4/29/2014</a:t>
             </a:fld>
             <a:endParaRPr lang="en-US" dirty="0"/>
           </a:p>
@@ -3248,7 +3248,7 @@
           <a:p>
             <a:fld id="{CC2990F0-8476-4A68-82FA-873BDD6B740E}" type="datetimeFigureOut">
               <a:rPr lang="en-US" smtClean="0"/>
-              <a:t>4/28/2014</a:t>
+              <a:t>4/29/2014</a:t>
             </a:fld>
             <a:endParaRPr lang="en-US" dirty="0"/>
           </a:p>
@@ -3622,7 +3622,7 @@
           <a:p>
             <a:fld id="{CC2990F0-8476-4A68-82FA-873BDD6B740E}" type="datetimeFigureOut">
               <a:rPr lang="en-US" smtClean="0"/>
-              <a:t>4/28/2014</a:t>
+              <a:t>4/29/2014</a:t>
             </a:fld>
             <a:endParaRPr lang="en-US" dirty="0"/>
           </a:p>
@@ -3968,7 +3968,7 @@
           <a:p>
             <a:fld id="{CC2990F0-8476-4A68-82FA-873BDD6B740E}" type="datetimeFigureOut">
               <a:rPr lang="en-US" smtClean="0"/>
-              <a:t>4/28/2014</a:t>
+              <a:t>4/29/2014</a:t>
             </a:fld>
             <a:endParaRPr lang="en-US" dirty="0"/>
           </a:p>
@@ -4743,13 +4743,8 @@
             <a:pPr lvl="1"/>
             <a:r>
               <a:rPr lang="en-US" dirty="0" smtClean="0"/>
-              <a:t>Update virtual </a:t>
-            </a:r>
-            <a:r>
-              <a:rPr lang="en-US" dirty="0" smtClean="0"/>
-              <a:t>world</a:t>
-            </a:r>
-            <a:endParaRPr lang="en-US" dirty="0" smtClean="0"/>
+              <a:t>Update virtual world</a:t>
+            </a:r>
           </a:p>
           <a:p>
             <a:r>
@@ -4934,12 +4929,12 @@
       </p:grpSpPr>
       <p:sp>
         <p:nvSpPr>
-          <p:cNvPr id="2" name="Content Placeholder 1"/>
-          <p:cNvSpPr>
-            <a:spLocks noGrp="1"/>
-          </p:cNvSpPr>
-          <p:nvPr>
-            <p:ph idx="1"/>
+          <p:cNvPr id="3" name="Title 2"/>
+          <p:cNvSpPr>
+            <a:spLocks noGrp="1"/>
+          </p:cNvSpPr>
+          <p:nvPr>
+            <p:ph type="title"/>
           </p:nvPr>
         </p:nvSpPr>
         <p:spPr/>
@@ -4947,25 +4942,6 @@
           <a:bodyPr/>
           <a:lstStyle/>
           <a:p>
-            <a:endParaRPr lang="en-US"/>
-          </a:p>
-        </p:txBody>
-      </p:sp>
-      <p:sp>
-        <p:nvSpPr>
-          <p:cNvPr id="3" name="Title 2"/>
-          <p:cNvSpPr>
-            <a:spLocks noGrp="1"/>
-          </p:cNvSpPr>
-          <p:nvPr>
-            <p:ph type="title"/>
-          </p:nvPr>
-        </p:nvSpPr>
-        <p:spPr/>
-        <p:txBody>
-          <a:bodyPr/>
-          <a:lstStyle/>
-          <a:p>
             <a:r>
               <a:rPr lang="en-US" dirty="0" smtClean="0"/>
               <a:t>Software Diagram</a:t>
@@ -4974,6 +4950,55 @@
           </a:p>
         </p:txBody>
       </p:sp>
+      <p:pic>
+        <p:nvPicPr>
+          <p:cNvPr id="1026" name="Picture 2" descr="D:\Users\Stephen\Documents\PRGM\Robotics\STM32\SeniorDesign\doc\software_diagram.png"/>
+          <p:cNvPicPr>
+            <a:picLocks noChangeAspect="1" noChangeArrowheads="1"/>
+          </p:cNvPicPr>
+          <p:nvPr/>
+        </p:nvPicPr>
+        <p:blipFill rotWithShape="1">
+          <a:blip r:embed="rId2" cstate="print">
+            <a:clrChange>
+              <a:clrFrom>
+                <a:srgbClr val="FFFFFF"/>
+              </a:clrFrom>
+              <a:clrTo>
+                <a:srgbClr val="FFFFFF">
+                  <a:alpha val="0"/>
+                </a:srgbClr>
+              </a:clrTo>
+            </a:clrChange>
+            <a:extLst>
+              <a:ext uri="{28A0092B-C50C-407E-A947-70E740481C1C}">
+                <a14:useLocalDpi xmlns:a14="http://schemas.microsoft.com/office/drawing/2010/main" val="0"/>
+              </a:ext>
+            </a:extLst>
+          </a:blip>
+          <a:srcRect/>
+          <a:stretch/>
+        </p:blipFill>
+        <p:spPr bwMode="auto">
+          <a:xfrm>
+            <a:off x="660400" y="1346396"/>
+            <a:ext cx="7823200" cy="5283004"/>
+          </a:xfrm>
+          <a:prstGeom prst="rect">
+            <a:avLst/>
+          </a:prstGeom>
+          <a:noFill/>
+          <a:extLst>
+            <a:ext uri="{909E8E84-426E-40DD-AFC4-6F175D3DCCD1}">
+              <a14:hiddenFill xmlns:a14="http://schemas.microsoft.com/office/drawing/2010/main">
+                <a:solidFill>
+                  <a:srgbClr val="FFFFFF"/>
+                </a:solidFill>
+              </a14:hiddenFill>
+            </a:ext>
+          </a:extLst>
+        </p:spPr>
+      </p:pic>
     </p:spTree>
     <p:extLst>
       <p:ext uri="{BB962C8B-B14F-4D97-AF65-F5344CB8AC3E}">
@@ -4984,13 +5009,13 @@
   <p:clrMapOvr>
     <a:masterClrMapping/>
   </p:clrMapOvr>
-  <mc:AlternateContent xmlns:mc="http://schemas.openxmlformats.org/markup-compatibility/2006">
-    <mc:Choice xmlns:p14="http://schemas.microsoft.com/office/powerpoint/2010/main" Requires="p14">
+  <mc:AlternateContent xmlns:mc="http://schemas.openxmlformats.org/markup-compatibility/2006" xmlns:p14="http://schemas.microsoft.com/office/powerpoint/2010/main">
+    <mc:Choice Requires="p14">
       <p:transition p14:dur="200">
         <p:fade/>
       </p:transition>
     </mc:Choice>
-    <mc:Fallback>
+    <mc:Fallback xmlns="">
       <p:transition>
         <p:fade/>
       </p:transition>
@@ -7332,11 +7357,7 @@
             <a:pPr lvl="1"/>
             <a:r>
               <a:rPr lang="en-US" dirty="0" smtClean="0"/>
-              <a:t>Reduced </a:t>
-            </a:r>
-            <a:r>
-              <a:rPr lang="en-US" dirty="0" smtClean="0"/>
-              <a:t>eye strain</a:t>
+              <a:t>Reduced eye strain</a:t>
             </a:r>
           </a:p>
           <a:p>
@@ -7481,7 +7502,6 @@
               <a:rPr lang="en-US" sz="2800" dirty="0" smtClean="0"/>
               <a:t>Adjustable</a:t>
             </a:r>
-            <a:endParaRPr lang="en-US" sz="2800" dirty="0" smtClean="0"/>
           </a:p>
           <a:p>
             <a:pPr lvl="1"/>
@@ -8028,11 +8048,7 @@
           <a:p>
             <a:r>
               <a:rPr lang="en-US" sz="3200" dirty="0" smtClean="0"/>
-              <a:t>Wireless </a:t>
-            </a:r>
-            <a:r>
-              <a:rPr lang="en-US" sz="3200" dirty="0" smtClean="0"/>
-              <a:t>N network</a:t>
+              <a:t>Wireless N network</a:t>
             </a:r>
           </a:p>
           <a:p>
@@ -8046,32 +8062,20 @@
             <a:pPr lvl="1"/>
             <a:r>
               <a:rPr lang="en-US" sz="2800" dirty="0" smtClean="0"/>
-              <a:t>Eliminate dedicated </a:t>
-            </a:r>
+              <a:t>Eliminate dedicated server</a:t>
+            </a:r>
+          </a:p>
+          <a:p>
+            <a:r>
+              <a:rPr lang="en-US" sz="3200" dirty="0" smtClean="0"/>
+              <a:t>Virtual image fidelity</a:t>
+            </a:r>
+          </a:p>
+          <a:p>
+            <a:pPr lvl="1"/>
             <a:r>
               <a:rPr lang="en-US" sz="2800" dirty="0" smtClean="0"/>
-              <a:t>server</a:t>
-            </a:r>
-          </a:p>
-          <a:p>
-            <a:r>
-              <a:rPr lang="en-US" sz="3200" dirty="0" smtClean="0"/>
-              <a:t>Virtual </a:t>
-            </a:r>
-            <a:r>
-              <a:rPr lang="en-US" sz="3200" dirty="0" smtClean="0"/>
-              <a:t>image fidelity</a:t>
-            </a:r>
-          </a:p>
-          <a:p>
-            <a:pPr lvl="1"/>
-            <a:r>
-              <a:rPr lang="en-US" sz="2800" dirty="0" smtClean="0"/>
-              <a:t>Improve </a:t>
-            </a:r>
-            <a:r>
-              <a:rPr lang="en-US" sz="2800" dirty="0" smtClean="0"/>
-              <a:t>brightness and contrast</a:t>
+              <a:t>Improve brightness and contrast</a:t>
             </a:r>
           </a:p>
           <a:p>
@@ -8802,11 +8806,7 @@
           <a:p>
             <a:r>
               <a:rPr lang="en-US" dirty="0" smtClean="0"/>
-              <a:t>DE2i-150 </a:t>
-            </a:r>
-            <a:r>
-              <a:rPr lang="en-US" dirty="0" smtClean="0"/>
-              <a:t>graphics drivers</a:t>
+              <a:t>DE2i-150 graphics drivers</a:t>
             </a:r>
           </a:p>
           <a:p>
@@ -8825,11 +8825,7 @@
           <a:p>
             <a:r>
               <a:rPr lang="en-US" dirty="0" smtClean="0"/>
-              <a:t>User </a:t>
-            </a:r>
-            <a:r>
-              <a:rPr lang="en-US" dirty="0" smtClean="0"/>
-              <a:t>testing is subjective</a:t>
+              <a:t>User testing is subjective</a:t>
             </a:r>
             <a:endParaRPr lang="en-US" dirty="0"/>
           </a:p>
@@ -9270,7 +9266,6 @@
               <a:rPr lang="en-US" sz="2800" dirty="0" smtClean="0"/>
               <a:t>Longer battery life</a:t>
             </a:r>
-            <a:endParaRPr lang="en-US" sz="2800" dirty="0" smtClean="0"/>
           </a:p>
           <a:p>
             <a:pPr lvl="1"/>
@@ -9283,11 +9278,7 @@
             <a:pPr lvl="1"/>
             <a:r>
               <a:rPr lang="en-US" sz="2800" dirty="0" smtClean="0"/>
-              <a:t>High </a:t>
-            </a:r>
-            <a:r>
-              <a:rPr lang="en-US" sz="2800" dirty="0" smtClean="0"/>
-              <a:t>cost (over $100)</a:t>
+              <a:t>High cost (over $100)</a:t>
             </a:r>
             <a:endParaRPr lang="en-US" sz="2800" dirty="0"/>
           </a:p>
@@ -9765,15 +9756,7 @@
             </a:r>
             <a:r>
               <a:rPr lang="en-US" sz="3200" dirty="0" smtClean="0"/>
-              <a:t>, </a:t>
-            </a:r>
-            <a:r>
-              <a:rPr lang="en-US" sz="3200" dirty="0" smtClean="0"/>
-              <a:t>ECE lab </a:t>
-            </a:r>
-            <a:r>
-              <a:rPr lang="en-US" sz="3200" dirty="0" smtClean="0"/>
-              <a:t>staff</a:t>
+              <a:t>, ECE lab staff</a:t>
             </a:r>
           </a:p>
           <a:p>
@@ -11694,11 +11677,7 @@
           <a:p>
             <a:r>
               <a:rPr lang="en-US" dirty="0" smtClean="0"/>
-              <a:t>Block </a:t>
-            </a:r>
-            <a:r>
-              <a:rPr lang="en-US" dirty="0" smtClean="0"/>
-              <a:t>Diagram</a:t>
+              <a:t>Block Diagram</a:t>
             </a:r>
           </a:p>
           <a:p>
@@ -11706,7 +11685,6 @@
               <a:rPr lang="en-US" dirty="0" smtClean="0"/>
               <a:t>Software Diagram</a:t>
             </a:r>
-            <a:endParaRPr lang="en-US" dirty="0" smtClean="0"/>
           </a:p>
         </p:txBody>
       </p:sp>
@@ -12579,7 +12557,7 @@
   <a:extraClrSchemeLst/>
   <a:extLst>
     <a:ext uri="{05A4C25C-085E-4340-85A3-A5531E510DB2}">
-      <thm15:themeFamily xmlns:thm15="http://schemas.microsoft.com/office/thememl/2012/main" name="Office Theme" id="{62F939B6-93AF-4DB8-9C6B-D6C7DFDC589F}" vid="{4A3C46E8-61CC-4603-A589-7422A47A8E4A}"/>
+      <thm15:themeFamily xmlns:thm15="http://schemas.microsoft.com/office/thememl/2012/main" xmlns="" name="Office Theme" id="{62F939B6-93AF-4DB8-9C6B-D6C7DFDC589F}" vid="{4A3C46E8-61CC-4603-A589-7422A47A8E4A}"/>
     </a:ext>
   </a:extLst>
 </a:theme>

</xml_diff>